<commit_message>
final pass on geracaocodigo
</commit_message>
<xml_diff>
--- a/slides-aulas/geracao-de-codigo.pptx
+++ b/slides-aulas/geracao-de-codigo.pptx
@@ -5,7 +5,7 @@
     <p:sldMasterId id="2147483648" r:id="rId1"/>
   </p:sldMasterIdLst>
   <p:notesMasterIdLst>
-    <p:notesMasterId r:id="rId16"/>
+    <p:notesMasterId r:id="rId15"/>
   </p:notesMasterIdLst>
   <p:sldIdLst>
     <p:sldId id="335" r:id="rId2"/>
@@ -21,7 +21,6 @@
     <p:sldId id="307" r:id="rId12"/>
     <p:sldId id="308" r:id="rId13"/>
     <p:sldId id="309" r:id="rId14"/>
-    <p:sldId id="329" r:id="rId15"/>
   </p:sldIdLst>
   <p:sldSz cx="9144000" cy="6858000" type="screen4x3"/>
   <p:notesSz cx="6858000" cy="9144000"/>
@@ -144,6 +143,7 @@
   <p1510:revLst>
     <p1510:client id="{2A0622D4-97B4-4143-8C10-4E78DA1D2895}" v="291" dt="2020-11-24T11:52:58.424"/>
     <p1510:client id="{3E4F2558-0ABD-4549-9B70-331621F8F2E4}" v="3288" dt="2020-11-23T21:45:49.293"/>
+    <p1510:client id="{552EB71D-9E99-470C-A1D8-AC6531CAC16A}" v="443" dt="2020-11-24T12:39:51.682"/>
     <p1510:client id="{68512AA5-AF24-4148-A638-A84F978FE952}" v="9" dt="2020-11-16T13:28:04.155"/>
   </p1510:revLst>
 </p1510:revInfo>
@@ -7622,115 +7622,6 @@
 </p:sld>
 </file>
 
-<file path=ppt/slides/slide14.xml><?xml version="1.0" encoding="utf-8"?>
-<p:sld xmlns:a="http://schemas.openxmlformats.org/drawingml/2006/main" xmlns:r="http://schemas.openxmlformats.org/officeDocument/2006/relationships" xmlns:p="http://schemas.openxmlformats.org/presentationml/2006/main">
-  <p:cSld>
-    <p:spTree>
-      <p:nvGrpSpPr>
-        <p:cNvPr id="1" name=""/>
-        <p:cNvGrpSpPr/>
-        <p:nvPr/>
-      </p:nvGrpSpPr>
-      <p:grpSpPr>
-        <a:xfrm>
-          <a:off x="0" y="0"/>
-          <a:ext cx="0" cy="0"/>
-          <a:chOff x="0" y="0"/>
-          <a:chExt cx="0" cy="0"/>
-        </a:xfrm>
-      </p:grpSpPr>
-      <p:sp>
-        <p:nvSpPr>
-          <p:cNvPr id="2" name="Título 1"/>
-          <p:cNvSpPr>
-            <a:spLocks noGrp="1"/>
-          </p:cNvSpPr>
-          <p:nvPr>
-            <p:ph type="title"/>
-          </p:nvPr>
-        </p:nvSpPr>
-        <p:spPr/>
-        <p:txBody>
-          <a:bodyPr/>
-          <a:lstStyle/>
-          <a:p>
-            <a:r>
-              <a:rPr lang="en-US" dirty="0"/>
-              <a:t>Aula prática—ilasm.exe</a:t>
-            </a:r>
-          </a:p>
-        </p:txBody>
-      </p:sp>
-      <p:sp>
-        <p:nvSpPr>
-          <p:cNvPr id="3" name="Espaço Reservado para Conteúdo 2"/>
-          <p:cNvSpPr>
-            <a:spLocks noGrp="1"/>
-          </p:cNvSpPr>
-          <p:nvPr>
-            <p:ph idx="1"/>
-          </p:nvPr>
-        </p:nvSpPr>
-        <p:spPr>
-          <a:xfrm>
-            <a:off x="457200" y="1600200"/>
-            <a:ext cx="8458200" cy="4525963"/>
-          </a:xfrm>
-        </p:spPr>
-        <p:txBody>
-          <a:bodyPr/>
-          <a:lstStyle/>
-          <a:p>
-            <a:r>
-              <a:rPr lang="pt-BR" dirty="0"/>
-              <a:t>ilasm.exe é o </a:t>
-            </a:r>
-            <a:r>
-              <a:rPr lang="pt-BR" dirty="0" err="1"/>
-              <a:t>assembler</a:t>
-            </a:r>
-            <a:r>
-              <a:rPr lang="pt-BR" dirty="0"/>
-              <a:t> da Microsoft</a:t>
-            </a:r>
-          </a:p>
-          <a:p>
-            <a:r>
-              <a:rPr lang="pt-BR" dirty="0"/>
-              <a:t>Entrada: MSIL</a:t>
-            </a:r>
-          </a:p>
-          <a:p>
-            <a:r>
-              <a:rPr lang="pt-BR" dirty="0"/>
-              <a:t>Saída: código x86</a:t>
-            </a:r>
-          </a:p>
-          <a:p>
-            <a:pPr lvl="1"/>
-            <a:r>
-              <a:rPr lang="pt-BR" dirty="0"/>
-              <a:t>executável nas máquinas Windows do laboratório</a:t>
-            </a:r>
-          </a:p>
-          <a:p>
-            <a:endParaRPr lang="en-US" dirty="0"/>
-          </a:p>
-        </p:txBody>
-      </p:sp>
-    </p:spTree>
-    <p:extLst>
-      <p:ext uri="{BB962C8B-B14F-4D97-AF65-F5344CB8AC3E}">
-        <p14:creationId xmlns:p14="http://schemas.microsoft.com/office/powerpoint/2010/main" val="1232821565"/>
-      </p:ext>
-    </p:extLst>
-  </p:cSld>
-  <p:clrMapOvr>
-    <a:masterClrMapping/>
-  </p:clrMapOvr>
-</p:sld>
-</file>
-
 <file path=ppt/slides/slide2.xml><?xml version="1.0" encoding="utf-8"?>
 <p:sld xmlns:a="http://schemas.openxmlformats.org/drawingml/2006/main" xmlns:r="http://schemas.openxmlformats.org/officeDocument/2006/relationships" xmlns:p="http://schemas.openxmlformats.org/presentationml/2006/main">
   <p:cSld>
@@ -8074,7 +7965,7 @@
           </a:ln>
           <a:extLst>
             <a:ext uri="{C572A759-6A51-4108-AA02-DFA0A04FC94B}">
-              <ma14:wrappingTextBoxFlag xmlns:ma14="http://schemas.microsoft.com/office/mac/drawingml/2011/main" xmlns="" xmlns:lc="http://schemas.openxmlformats.org/drawingml/2006/lockedCanvas" val="1"/>
+              <ma14:wrappingTextBoxFlag xmlns:lc="http://schemas.openxmlformats.org/drawingml/2006/lockedCanvas" xmlns="" xmlns:ma14="http://schemas.microsoft.com/office/mac/drawingml/2011/main" val="1"/>
             </a:ext>
           </a:extLst>
         </p:spPr>
@@ -8493,7 +8384,7 @@
           </a:ln>
           <a:extLst>
             <a:ext uri="{C572A759-6A51-4108-AA02-DFA0A04FC94B}">
-              <ma14:wrappingTextBoxFlag xmlns:ma14="http://schemas.microsoft.com/office/mac/drawingml/2011/main" xmlns="" xmlns:lc="http://schemas.openxmlformats.org/drawingml/2006/lockedCanvas" val="1"/>
+              <ma14:wrappingTextBoxFlag xmlns:lc="http://schemas.openxmlformats.org/drawingml/2006/lockedCanvas" xmlns="" xmlns:ma14="http://schemas.microsoft.com/office/mac/drawingml/2011/main" val="1"/>
             </a:ext>
           </a:extLst>
         </p:spPr>
@@ -8633,7 +8524,7 @@
           </a:ln>
           <a:extLst>
             <a:ext uri="{C572A759-6A51-4108-AA02-DFA0A04FC94B}">
-              <ma14:wrappingTextBoxFlag xmlns:ma14="http://schemas.microsoft.com/office/mac/drawingml/2011/main" xmlns="" xmlns:lc="http://schemas.openxmlformats.org/drawingml/2006/lockedCanvas" val="1"/>
+              <ma14:wrappingTextBoxFlag xmlns:lc="http://schemas.openxmlformats.org/drawingml/2006/lockedCanvas" xmlns="" xmlns:ma14="http://schemas.microsoft.com/office/mac/drawingml/2011/main" val="1"/>
             </a:ext>
           </a:extLst>
         </p:spPr>
@@ -8773,7 +8664,7 @@
           </a:ln>
           <a:extLst>
             <a:ext uri="{C572A759-6A51-4108-AA02-DFA0A04FC94B}">
-              <ma14:wrappingTextBoxFlag xmlns:ma14="http://schemas.microsoft.com/office/mac/drawingml/2011/main" xmlns="" xmlns:lc="http://schemas.openxmlformats.org/drawingml/2006/lockedCanvas" val="1"/>
+              <ma14:wrappingTextBoxFlag xmlns:lc="http://schemas.openxmlformats.org/drawingml/2006/lockedCanvas" xmlns="" xmlns:ma14="http://schemas.microsoft.com/office/mac/drawingml/2011/main" val="1"/>
             </a:ext>
           </a:extLst>
         </p:spPr>
@@ -8917,7 +8808,7 @@
           </a:ln>
           <a:extLst>
             <a:ext uri="{C572A759-6A51-4108-AA02-DFA0A04FC94B}">
-              <ma14:wrappingTextBoxFlag xmlns:lc="http://schemas.openxmlformats.org/drawingml/2006/lockedCanvas" xmlns="" xmlns:ma14="http://schemas.microsoft.com/office/mac/drawingml/2011/main" val="1"/>
+              <ma14:wrappingTextBoxFlag xmlns:ma14="http://schemas.microsoft.com/office/mac/drawingml/2011/main" xmlns="" xmlns:lc="http://schemas.openxmlformats.org/drawingml/2006/lockedCanvas" val="1"/>
             </a:ext>
           </a:extLst>
         </p:spPr>
@@ -9061,7 +8952,7 @@
           </a:ln>
           <a:extLst>
             <a:ext uri="{C572A759-6A51-4108-AA02-DFA0A04FC94B}">
-              <ma14:wrappingTextBoxFlag xmlns:lc="http://schemas.openxmlformats.org/drawingml/2006/lockedCanvas" xmlns="" xmlns:ma14="http://schemas.microsoft.com/office/mac/drawingml/2011/main" val="1"/>
+              <ma14:wrappingTextBoxFlag xmlns:ma14="http://schemas.microsoft.com/office/mac/drawingml/2011/main" xmlns="" xmlns:lc="http://schemas.openxmlformats.org/drawingml/2006/lockedCanvas" val="1"/>
             </a:ext>
           </a:extLst>
         </p:spPr>
@@ -9627,7 +9518,7 @@
           </a:ln>
           <a:extLst>
             <a:ext uri="{C572A759-6A51-4108-AA02-DFA0A04FC94B}">
-              <ma14:wrappingTextBoxFlag xmlns:ma14="http://schemas.microsoft.com/office/mac/drawingml/2011/main" xmlns="" xmlns:lc="http://schemas.openxmlformats.org/drawingml/2006/lockedCanvas" val="1"/>
+              <ma14:wrappingTextBoxFlag xmlns:lc="http://schemas.openxmlformats.org/drawingml/2006/lockedCanvas" xmlns="" xmlns:ma14="http://schemas.microsoft.com/office/mac/drawingml/2011/main" val="1"/>
             </a:ext>
           </a:extLst>
         </p:spPr>
@@ -10167,7 +10058,7 @@
           </a:ln>
           <a:extLst>
             <a:ext uri="{C572A759-6A51-4108-AA02-DFA0A04FC94B}">
-              <ma14:wrappingTextBoxFlag xmlns:lc="http://schemas.openxmlformats.org/drawingml/2006/lockedCanvas" xmlns="" xmlns:ma14="http://schemas.microsoft.com/office/mac/drawingml/2011/main" val="1"/>
+              <ma14:wrappingTextBoxFlag xmlns:ma14="http://schemas.microsoft.com/office/mac/drawingml/2011/main" xmlns="" xmlns:lc="http://schemas.openxmlformats.org/drawingml/2006/lockedCanvas" val="1"/>
             </a:ext>
           </a:extLst>
         </p:spPr>
@@ -10586,7 +10477,7 @@
           </a:ln>
           <a:extLst>
             <a:ext uri="{C572A759-6A51-4108-AA02-DFA0A04FC94B}">
-              <ma14:wrappingTextBoxFlag xmlns:lc="http://schemas.openxmlformats.org/drawingml/2006/lockedCanvas" xmlns="" xmlns:ma14="http://schemas.microsoft.com/office/mac/drawingml/2011/main" val="1"/>
+              <ma14:wrappingTextBoxFlag xmlns:ma14="http://schemas.microsoft.com/office/mac/drawingml/2011/main" xmlns="" xmlns:lc="http://schemas.openxmlformats.org/drawingml/2006/lockedCanvas" val="1"/>
             </a:ext>
           </a:extLst>
         </p:spPr>
@@ -10726,7 +10617,7 @@
           </a:ln>
           <a:extLst>
             <a:ext uri="{C572A759-6A51-4108-AA02-DFA0A04FC94B}">
-              <ma14:wrappingTextBoxFlag xmlns:lc="http://schemas.openxmlformats.org/drawingml/2006/lockedCanvas" xmlns="" xmlns:ma14="http://schemas.microsoft.com/office/mac/drawingml/2011/main" val="1"/>
+              <ma14:wrappingTextBoxFlag xmlns:ma14="http://schemas.microsoft.com/office/mac/drawingml/2011/main" xmlns="" xmlns:lc="http://schemas.openxmlformats.org/drawingml/2006/lockedCanvas" val="1"/>
             </a:ext>
           </a:extLst>
         </p:spPr>
@@ -10866,7 +10757,7 @@
           </a:ln>
           <a:extLst>
             <a:ext uri="{C572A759-6A51-4108-AA02-DFA0A04FC94B}">
-              <ma14:wrappingTextBoxFlag xmlns:lc="http://schemas.openxmlformats.org/drawingml/2006/lockedCanvas" xmlns="" xmlns:ma14="http://schemas.microsoft.com/office/mac/drawingml/2011/main" val="1"/>
+              <ma14:wrappingTextBoxFlag xmlns:ma14="http://schemas.microsoft.com/office/mac/drawingml/2011/main" xmlns="" xmlns:lc="http://schemas.openxmlformats.org/drawingml/2006/lockedCanvas" val="1"/>
             </a:ext>
           </a:extLst>
         </p:spPr>
@@ -11010,7 +10901,7 @@
           </a:ln>
           <a:extLst>
             <a:ext uri="{C572A759-6A51-4108-AA02-DFA0A04FC94B}">
-              <ma14:wrappingTextBoxFlag xmlns:ma14="http://schemas.microsoft.com/office/mac/drawingml/2011/main" xmlns="" xmlns:lc="http://schemas.openxmlformats.org/drawingml/2006/lockedCanvas" val="1"/>
+              <ma14:wrappingTextBoxFlag xmlns:lc="http://schemas.openxmlformats.org/drawingml/2006/lockedCanvas" xmlns="" xmlns:ma14="http://schemas.microsoft.com/office/mac/drawingml/2011/main" val="1"/>
             </a:ext>
           </a:extLst>
         </p:spPr>
@@ -11154,7 +11045,7 @@
           </a:ln>
           <a:extLst>
             <a:ext uri="{C572A759-6A51-4108-AA02-DFA0A04FC94B}">
-              <ma14:wrappingTextBoxFlag xmlns:ma14="http://schemas.microsoft.com/office/mac/drawingml/2011/main" xmlns="" xmlns:lc="http://schemas.openxmlformats.org/drawingml/2006/lockedCanvas" val="1"/>
+              <ma14:wrappingTextBoxFlag xmlns:lc="http://schemas.openxmlformats.org/drawingml/2006/lockedCanvas" xmlns="" xmlns:ma14="http://schemas.microsoft.com/office/mac/drawingml/2011/main" val="1"/>
             </a:ext>
           </a:extLst>
         </p:spPr>
@@ -11720,7 +11611,7 @@
           </a:ln>
           <a:extLst>
             <a:ext uri="{C572A759-6A51-4108-AA02-DFA0A04FC94B}">
-              <ma14:wrappingTextBoxFlag xmlns:lc="http://schemas.openxmlformats.org/drawingml/2006/lockedCanvas" xmlns="" xmlns:ma14="http://schemas.microsoft.com/office/mac/drawingml/2011/main" val="1"/>
+              <ma14:wrappingTextBoxFlag xmlns:ma14="http://schemas.microsoft.com/office/mac/drawingml/2011/main" xmlns="" xmlns:lc="http://schemas.openxmlformats.org/drawingml/2006/lockedCanvas" val="1"/>
             </a:ext>
           </a:extLst>
         </p:spPr>
@@ -12196,12 +12087,12 @@
         <p:spPr>
           <a:xfrm>
             <a:off x="457200" y="1600200"/>
-            <a:ext cx="8839610" cy="4951122"/>
+            <a:ext cx="8642435" cy="4951122"/>
           </a:xfrm>
         </p:spPr>
         <p:txBody>
           <a:bodyPr vert="horz" lIns="91440" tIns="45720" rIns="91440" bIns="45720" rtlCol="0" anchor="t">
-            <a:normAutofit fontScale="92500" lnSpcReduction="20000"/>
+            <a:normAutofit/>
           </a:bodyPr>
           <a:lstStyle/>
           <a:p>
@@ -12358,37 +12249,89 @@
               <a:rPr lang="en-US" dirty="0" err="1">
                 <a:cs typeface="Calibri"/>
               </a:rPr>
-              <a:t>já</a:t>
+              <a:t>em</a:t>
             </a:r>
             <a:r>
               <a:rPr lang="en-US" dirty="0">
                 <a:cs typeface="Calibri"/>
               </a:rPr>
-              <a:t> </a:t>
+              <a:t> um </a:t>
             </a:r>
             <a:r>
               <a:rPr lang="en-US" dirty="0" err="1">
                 <a:cs typeface="Calibri"/>
               </a:rPr>
-              <a:t>em</a:t>
-            </a:r>
+              <a:t>registrador</a:t>
+            </a:r>
+            <a:endParaRPr lang="en-US" dirty="0">
+              <a:cs typeface="Calibri"/>
+            </a:endParaRPr>
+          </a:p>
+          <a:p>
+            <a:pPr marL="514350" indent="-514350">
+              <a:buAutoNum type="arabicPeriod"/>
+            </a:pPr>
+            <a:r>
+              <a:rPr lang="en-US" dirty="0" err="1">
+                <a:ea typeface="+mn-lt"/>
+                <a:cs typeface="+mn-lt"/>
+              </a:rPr>
+              <a:t>Atualize</a:t>
+            </a:r>
+            <a:r>
+              <a:rPr lang="en-US" dirty="0">
+                <a:ea typeface="+mn-lt"/>
+                <a:cs typeface="+mn-lt"/>
+              </a:rPr>
+              <a:t> DR e DE. DR </a:t>
+            </a:r>
+            <a:r>
+              <a:rPr lang="en-US" dirty="0" err="1">
+                <a:ea typeface="+mn-lt"/>
+                <a:cs typeface="+mn-lt"/>
+              </a:rPr>
+              <a:t>tem</a:t>
+            </a:r>
+            <a:r>
+              <a:rPr lang="en-US" dirty="0">
+                <a:ea typeface="+mn-lt"/>
+                <a:cs typeface="+mn-lt"/>
+              </a:rPr>
+              <a:t> {R0: y}, DE </a:t>
+            </a:r>
+            <a:r>
+              <a:rPr lang="en-US" dirty="0" err="1">
+                <a:ea typeface="+mn-lt"/>
+                <a:cs typeface="+mn-lt"/>
+              </a:rPr>
+              <a:t>tem</a:t>
+            </a:r>
+            <a:r>
+              <a:rPr lang="en-US" dirty="0">
+                <a:ea typeface="+mn-lt"/>
+                <a:cs typeface="+mn-lt"/>
+              </a:rPr>
+              <a:t> {y: R0}</a:t>
+            </a:r>
+            <a:endParaRPr lang="en-US" dirty="0">
+              <a:cs typeface="Calibri"/>
+            </a:endParaRPr>
+          </a:p>
+          <a:p>
+            <a:pPr marL="514350" indent="-514350">
+              <a:buAutoNum type="arabicPeriod"/>
+            </a:pPr>
             <a:r>
               <a:rPr lang="en-US" dirty="0">
                 <a:cs typeface="Calibri"/>
               </a:rPr>
-              <a:t> um reg.</a:t>
-            </a:r>
-            <a:endParaRPr lang="en-US"/>
-          </a:p>
-          <a:p>
-            <a:pPr marL="457200" lvl="1" indent="0">
-              <a:buNone/>
-            </a:pPr>
+              <a:t>Gere "op z, R0" Isto </a:t>
+            </a:r>
             <a:r>
               <a:rPr lang="en-US" dirty="0" err="1">
                 <a:cs typeface="Calibri"/>
               </a:rPr>
-              <a:t>Atualize</a:t>
+              <a:t>vai</a:t>
             </a:r>
             <a:r>
               <a:rPr lang="en-US" dirty="0">
@@ -12400,378 +12343,130 @@
               <a:rPr lang="en-US" dirty="0" err="1">
                 <a:cs typeface="Calibri"/>
               </a:rPr>
-              <a:t>descritor</a:t>
+              <a:t>sobrepor</a:t>
             </a:r>
             <a:r>
               <a:rPr lang="en-US" dirty="0">
                 <a:cs typeface="Calibri"/>
               </a:rPr>
-              <a:t> de </a:t>
+              <a:t> </a:t>
             </a:r>
             <a:r>
               <a:rPr lang="en-US" dirty="0" err="1">
                 <a:cs typeface="Calibri"/>
               </a:rPr>
-              <a:t>registro</a:t>
+              <a:t>o</a:t>
             </a:r>
             <a:r>
               <a:rPr lang="en-US" dirty="0">
                 <a:cs typeface="Calibri"/>
               </a:rPr>
-              <a:t> e </a:t>
+              <a:t> valor do </a:t>
             </a:r>
             <a:r>
               <a:rPr lang="en-US" dirty="0" err="1">
                 <a:cs typeface="Calibri"/>
               </a:rPr>
-              <a:t>endereço</a:t>
+              <a:t>registrador</a:t>
+            </a:r>
+            <a:r>
+              <a:rPr lang="en-US" dirty="0">
+                <a:cs typeface="Calibri"/>
+              </a:rPr>
+              <a:t> </a:t>
+            </a:r>
+            <a:r>
+              <a:rPr lang="en-US" dirty="0" err="1">
+                <a:cs typeface="Calibri"/>
+              </a:rPr>
+              <a:t>onde</a:t>
+            </a:r>
+            <a:r>
+              <a:rPr lang="en-US" dirty="0">
+                <a:cs typeface="Calibri"/>
+              </a:rPr>
+              <a:t> y </a:t>
+            </a:r>
+            <a:r>
+              <a:rPr lang="en-US" dirty="0" err="1">
+                <a:cs typeface="Calibri"/>
+              </a:rPr>
+              <a:t>foi</a:t>
+            </a:r>
+            <a:r>
+              <a:rPr lang="en-US" dirty="0">
+                <a:cs typeface="Calibri"/>
+              </a:rPr>
+              <a:t> </a:t>
+            </a:r>
+            <a:r>
+              <a:rPr lang="en-US" dirty="0" err="1">
+                <a:cs typeface="Calibri"/>
+              </a:rPr>
+              <a:t>armazenado</a:t>
+            </a:r>
+            <a:r>
+              <a:rPr lang="en-US" dirty="0">
+                <a:cs typeface="Calibri"/>
+              </a:rPr>
+              <a:t>.*</a:t>
+            </a:r>
+            <a:r>
+              <a:rPr lang="en-US" dirty="0" err="1">
+                <a:cs typeface="Calibri"/>
+              </a:rPr>
+              <a:t>Atualize</a:t>
+            </a:r>
+            <a:r>
+              <a:rPr lang="en-US" dirty="0">
+                <a:cs typeface="Calibri"/>
+              </a:rPr>
+              <a:t> DR e DE</a:t>
+            </a:r>
+          </a:p>
+          <a:p>
+            <a:pPr marL="514350" indent="-514350">
+              <a:buAutoNum type="arabicPeriod"/>
+            </a:pPr>
+            <a:r>
+              <a:rPr lang="en-US" dirty="0" err="1">
+                <a:cs typeface="Calibri"/>
+              </a:rPr>
+              <a:t>Atualize</a:t>
+            </a:r>
+            <a:r>
+              <a:rPr lang="en-US" dirty="0">
+                <a:cs typeface="Calibri"/>
+              </a:rPr>
+              <a:t> DR e DE. DR </a:t>
+            </a:r>
+            <a:r>
+              <a:rPr lang="en-US" dirty="0" err="1">
+                <a:cs typeface="Calibri"/>
+              </a:rPr>
+              <a:t>tem</a:t>
+            </a:r>
+            <a:r>
+              <a:rPr lang="en-US" dirty="0">
+                <a:cs typeface="Calibri"/>
+              </a:rPr>
+              <a:t> {R0: x}, DE </a:t>
+            </a:r>
+            <a:r>
+              <a:rPr lang="en-US" dirty="0" err="1">
+                <a:cs typeface="Calibri"/>
+              </a:rPr>
+              <a:t>tem</a:t>
+            </a:r>
+            <a:r>
+              <a:rPr lang="en-US" dirty="0">
+                <a:cs typeface="Calibri"/>
+              </a:rPr>
+              <a:t> {x: R0}</a:t>
             </a:r>
             <a:endParaRPr lang="en-US">
               <a:cs typeface="Calibri"/>
             </a:endParaRPr>
-          </a:p>
-          <a:p>
-            <a:pPr marL="514350" indent="-514350">
-              <a:buAutoNum type="arabicPeriod"/>
-            </a:pPr>
-            <a:r>
-              <a:rPr lang="en-US" dirty="0">
-                <a:cs typeface="Calibri"/>
-              </a:rPr>
-              <a:t>Gere "op z, R0" Isto </a:t>
-            </a:r>
-            <a:r>
-              <a:rPr lang="en-US" dirty="0" err="1">
-                <a:cs typeface="Calibri"/>
-              </a:rPr>
-              <a:t>vai</a:t>
-            </a:r>
-            <a:r>
-              <a:rPr lang="en-US" dirty="0">
-                <a:cs typeface="Calibri"/>
-              </a:rPr>
-              <a:t> </a:t>
-            </a:r>
-            <a:r>
-              <a:rPr lang="en-US" dirty="0" err="1">
-                <a:cs typeface="Calibri"/>
-              </a:rPr>
-              <a:t>sobrepor</a:t>
-            </a:r>
-            <a:r>
-              <a:rPr lang="en-US" dirty="0">
-                <a:cs typeface="Calibri"/>
-              </a:rPr>
-              <a:t> </a:t>
-            </a:r>
-            <a:r>
-              <a:rPr lang="en-US" dirty="0" err="1">
-                <a:cs typeface="Calibri"/>
-              </a:rPr>
-              <a:t>o</a:t>
-            </a:r>
-            <a:r>
-              <a:rPr lang="en-US" dirty="0">
-                <a:cs typeface="Calibri"/>
-              </a:rPr>
-              <a:t> valor do </a:t>
-            </a:r>
-            <a:r>
-              <a:rPr lang="en-US" dirty="0" err="1">
-                <a:cs typeface="Calibri"/>
-              </a:rPr>
-              <a:t>registrador</a:t>
-            </a:r>
-            <a:r>
-              <a:rPr lang="en-US" dirty="0">
-                <a:cs typeface="Calibri"/>
-              </a:rPr>
-              <a:t> </a:t>
-            </a:r>
-            <a:r>
-              <a:rPr lang="en-US" dirty="0" err="1">
-                <a:cs typeface="Calibri"/>
-              </a:rPr>
-              <a:t>onde</a:t>
-            </a:r>
-            <a:r>
-              <a:rPr lang="en-US" dirty="0">
-                <a:cs typeface="Calibri"/>
-              </a:rPr>
-              <a:t> y </a:t>
-            </a:r>
-            <a:r>
-              <a:rPr lang="en-US" dirty="0" err="1">
-                <a:cs typeface="Calibri"/>
-              </a:rPr>
-              <a:t>foi</a:t>
-            </a:r>
-            <a:r>
-              <a:rPr lang="en-US" dirty="0">
-                <a:cs typeface="Calibri"/>
-              </a:rPr>
-              <a:t> </a:t>
-            </a:r>
-            <a:r>
-              <a:rPr lang="en-US" dirty="0" err="1">
-                <a:cs typeface="Calibri"/>
-              </a:rPr>
-              <a:t>armazenado</a:t>
-            </a:r>
-            <a:endParaRPr lang="en-US" dirty="0">
-              <a:cs typeface="Calibri"/>
-            </a:endParaRPr>
-          </a:p>
-          <a:p>
-            <a:pPr marL="457200" lvl="1" indent="0">
-              <a:buNone/>
-            </a:pPr>
-            <a:r>
-              <a:rPr lang="en-US" dirty="0">
-                <a:ea typeface="+mn-lt"/>
-                <a:cs typeface="+mn-lt"/>
-              </a:rPr>
-              <a:t>* </a:t>
-            </a:r>
-            <a:r>
-              <a:rPr lang="en-US" dirty="0" err="1">
-                <a:ea typeface="+mn-lt"/>
-                <a:cs typeface="+mn-lt"/>
-              </a:rPr>
-              <a:t>Atualize</a:t>
-            </a:r>
-            <a:r>
-              <a:rPr lang="en-US" dirty="0">
-                <a:ea typeface="+mn-lt"/>
-                <a:cs typeface="+mn-lt"/>
-              </a:rPr>
-              <a:t> </a:t>
-            </a:r>
-            <a:r>
-              <a:rPr lang="en-US" dirty="0" err="1">
-                <a:ea typeface="+mn-lt"/>
-                <a:cs typeface="+mn-lt"/>
-              </a:rPr>
-              <a:t>descritor</a:t>
-            </a:r>
-            <a:r>
-              <a:rPr lang="en-US" dirty="0">
-                <a:ea typeface="+mn-lt"/>
-                <a:cs typeface="+mn-lt"/>
-              </a:rPr>
-              <a:t> de </a:t>
-            </a:r>
-            <a:r>
-              <a:rPr lang="en-US" dirty="0" err="1">
-                <a:ea typeface="+mn-lt"/>
-                <a:cs typeface="+mn-lt"/>
-              </a:rPr>
-              <a:t>registro</a:t>
-            </a:r>
-            <a:r>
-              <a:rPr lang="en-US" dirty="0">
-                <a:ea typeface="+mn-lt"/>
-                <a:cs typeface="+mn-lt"/>
-              </a:rPr>
-              <a:t> e </a:t>
-            </a:r>
-            <a:r>
-              <a:rPr lang="en-US" dirty="0" err="1">
-                <a:ea typeface="+mn-lt"/>
-                <a:cs typeface="+mn-lt"/>
-              </a:rPr>
-              <a:t>endereço</a:t>
-            </a:r>
-            <a:endParaRPr lang="en-US" dirty="0">
-              <a:ea typeface="+mn-lt"/>
-              <a:cs typeface="+mn-lt"/>
-            </a:endParaRPr>
-          </a:p>
-          <a:p>
-            <a:pPr marL="514350" indent="-514350">
-              <a:buAutoNum type="arabicPeriod"/>
-            </a:pPr>
-            <a:r>
-              <a:rPr lang="en-US" dirty="0">
-                <a:cs typeface="Calibri"/>
-              </a:rPr>
-              <a:t>Gere move y, DE(x)</a:t>
-            </a:r>
-          </a:p>
-          <a:p>
-            <a:pPr marL="514350" indent="-514350">
-              <a:buAutoNum type="arabicPeriod"/>
-            </a:pPr>
-            <a:r>
-              <a:rPr lang="en-US" dirty="0" err="1">
-                <a:cs typeface="Calibri"/>
-              </a:rPr>
-              <a:t>Limpe</a:t>
-            </a:r>
-            <a:r>
-              <a:rPr lang="en-US" dirty="0">
-                <a:cs typeface="Calibri"/>
-              </a:rPr>
-              <a:t> </a:t>
-            </a:r>
-            <a:r>
-              <a:rPr lang="en-US" dirty="0" err="1">
-                <a:cs typeface="Calibri"/>
-              </a:rPr>
-              <a:t>descritores</a:t>
-            </a:r>
-            <a:r>
-              <a:rPr lang="en-US" dirty="0">
-                <a:cs typeface="Calibri"/>
-              </a:rPr>
-              <a:t> de </a:t>
-            </a:r>
-            <a:r>
-              <a:rPr lang="en-US" dirty="0" err="1">
-                <a:cs typeface="Calibri"/>
-              </a:rPr>
-              <a:t>endereço</a:t>
-            </a:r>
-            <a:r>
-              <a:rPr lang="en-US" dirty="0">
-                <a:cs typeface="Calibri"/>
-              </a:rPr>
-              <a:t> </a:t>
-            </a:r>
-            <a:r>
-              <a:rPr lang="en-US" dirty="0" err="1">
-                <a:cs typeface="Calibri"/>
-              </a:rPr>
-              <a:t>associados</a:t>
-            </a:r>
-            <a:r>
-              <a:rPr lang="en-US" dirty="0">
-                <a:cs typeface="Calibri"/>
-              </a:rPr>
-              <a:t> a y e z se </a:t>
-            </a:r>
-            <a:r>
-              <a:rPr lang="en-US" dirty="0" err="1">
-                <a:cs typeface="Calibri"/>
-              </a:rPr>
-              <a:t>não</a:t>
-            </a:r>
-            <a:r>
-              <a:rPr lang="en-US" dirty="0">
-                <a:cs typeface="Calibri"/>
-              </a:rPr>
-              <a:t> </a:t>
-            </a:r>
-            <a:r>
-              <a:rPr lang="en-US" dirty="0" err="1">
-                <a:cs typeface="Calibri"/>
-              </a:rPr>
-              <a:t>forem</a:t>
-            </a:r>
-            <a:r>
-              <a:rPr lang="en-US" dirty="0">
-                <a:cs typeface="Calibri"/>
-              </a:rPr>
-              <a:t> ser </a:t>
-            </a:r>
-            <a:r>
-              <a:rPr lang="en-US" dirty="0" err="1">
-                <a:cs typeface="Calibri"/>
-              </a:rPr>
-              <a:t>mais</a:t>
-            </a:r>
-            <a:r>
-              <a:rPr lang="en-US" dirty="0">
-                <a:cs typeface="Calibri"/>
-              </a:rPr>
-              <a:t> </a:t>
-            </a:r>
-            <a:r>
-              <a:rPr lang="en-US" dirty="0" err="1">
-                <a:cs typeface="Calibri"/>
-              </a:rPr>
-              <a:t>usados</a:t>
-            </a:r>
-            <a:r>
-              <a:rPr lang="en-US" dirty="0">
-                <a:cs typeface="Calibri"/>
-              </a:rPr>
-              <a:t> </a:t>
-            </a:r>
-            <a:endParaRPr lang="en-US">
-              <a:cs typeface="Calibri"/>
-            </a:endParaRPr>
-          </a:p>
-          <a:p>
-            <a:pPr marL="0" indent="0">
-              <a:buNone/>
-            </a:pPr>
-            <a:r>
-              <a:rPr lang="en-US" dirty="0">
-                <a:cs typeface="Calibri"/>
-              </a:rPr>
-              <a:t>      * </a:t>
-            </a:r>
-            <a:r>
-              <a:rPr lang="en-US" dirty="0" err="1">
-                <a:cs typeface="Calibri"/>
-              </a:rPr>
-              <a:t>compilador</a:t>
-            </a:r>
-            <a:r>
-              <a:rPr lang="en-US" dirty="0">
-                <a:cs typeface="Calibri"/>
-              </a:rPr>
-              <a:t> </a:t>
-            </a:r>
-            <a:r>
-              <a:rPr lang="en-US" dirty="0" err="1">
-                <a:cs typeface="Calibri"/>
-              </a:rPr>
-              <a:t>pode</a:t>
-            </a:r>
-            <a:r>
-              <a:rPr lang="en-US" dirty="0">
-                <a:cs typeface="Calibri"/>
-              </a:rPr>
-              <a:t> </a:t>
-            </a:r>
-            <a:r>
-              <a:rPr lang="en-US" dirty="0" err="1">
-                <a:cs typeface="Calibri"/>
-              </a:rPr>
-              <a:t>calcular</a:t>
-            </a:r>
-            <a:r>
-              <a:rPr lang="en-US" dirty="0">
-                <a:cs typeface="Calibri"/>
-              </a:rPr>
-              <a:t> info "</a:t>
-            </a:r>
-            <a:r>
-              <a:rPr lang="en-US" dirty="0" err="1">
-                <a:cs typeface="Calibri"/>
-              </a:rPr>
-              <a:t>variáveis</a:t>
-            </a:r>
-            <a:r>
-              <a:rPr lang="en-US" dirty="0">
-                <a:cs typeface="Calibri"/>
-              </a:rPr>
-              <a:t> </a:t>
-            </a:r>
-            <a:r>
-              <a:rPr lang="en-US" dirty="0" err="1">
-                <a:cs typeface="Calibri"/>
-              </a:rPr>
-              <a:t>vivas</a:t>
-            </a:r>
-            <a:r>
-              <a:rPr lang="en-US" dirty="0">
-                <a:cs typeface="Calibri"/>
-              </a:rPr>
-              <a:t>"</a:t>
-            </a:r>
           </a:p>
           <a:p>
             <a:endParaRPr lang="en-US" dirty="0">
@@ -14171,7 +13866,7 @@
           </a:ln>
           <a:extLst>
             <a:ext uri="{C572A759-6A51-4108-AA02-DFA0A04FC94B}">
-              <ma14:wrappingTextBoxFlag xmlns:lc="http://schemas.openxmlformats.org/drawingml/2006/lockedCanvas" xmlns="" xmlns:ma14="http://schemas.microsoft.com/office/mac/drawingml/2011/main" val="1"/>
+              <ma14:wrappingTextBoxFlag xmlns:ma14="http://schemas.microsoft.com/office/mac/drawingml/2011/main" xmlns="" xmlns:lc="http://schemas.openxmlformats.org/drawingml/2006/lockedCanvas" val="1"/>
             </a:ext>
           </a:extLst>
         </p:spPr>
@@ -14590,7 +14285,7 @@
           </a:ln>
           <a:extLst>
             <a:ext uri="{C572A759-6A51-4108-AA02-DFA0A04FC94B}">
-              <ma14:wrappingTextBoxFlag xmlns:lc="http://schemas.openxmlformats.org/drawingml/2006/lockedCanvas" xmlns="" xmlns:ma14="http://schemas.microsoft.com/office/mac/drawingml/2011/main" val="1"/>
+              <ma14:wrappingTextBoxFlag xmlns:ma14="http://schemas.microsoft.com/office/mac/drawingml/2011/main" xmlns="" xmlns:lc="http://schemas.openxmlformats.org/drawingml/2006/lockedCanvas" val="1"/>
             </a:ext>
           </a:extLst>
         </p:spPr>
@@ -14730,7 +14425,7 @@
           </a:ln>
           <a:extLst>
             <a:ext uri="{C572A759-6A51-4108-AA02-DFA0A04FC94B}">
-              <ma14:wrappingTextBoxFlag xmlns:lc="http://schemas.openxmlformats.org/drawingml/2006/lockedCanvas" xmlns="" xmlns:ma14="http://schemas.microsoft.com/office/mac/drawingml/2011/main" val="1"/>
+              <ma14:wrappingTextBoxFlag xmlns:ma14="http://schemas.microsoft.com/office/mac/drawingml/2011/main" xmlns="" xmlns:lc="http://schemas.openxmlformats.org/drawingml/2006/lockedCanvas" val="1"/>
             </a:ext>
           </a:extLst>
         </p:spPr>
@@ -14870,7 +14565,7 @@
           </a:ln>
           <a:extLst>
             <a:ext uri="{C572A759-6A51-4108-AA02-DFA0A04FC94B}">
-              <ma14:wrappingTextBoxFlag xmlns:lc="http://schemas.openxmlformats.org/drawingml/2006/lockedCanvas" xmlns="" xmlns:ma14="http://schemas.microsoft.com/office/mac/drawingml/2011/main" val="1"/>
+              <ma14:wrappingTextBoxFlag xmlns:ma14="http://schemas.microsoft.com/office/mac/drawingml/2011/main" xmlns="" xmlns:lc="http://schemas.openxmlformats.org/drawingml/2006/lockedCanvas" val="1"/>
             </a:ext>
           </a:extLst>
         </p:spPr>
@@ -15014,7 +14709,7 @@
           </a:ln>
           <a:extLst>
             <a:ext uri="{C572A759-6A51-4108-AA02-DFA0A04FC94B}">
-              <ma14:wrappingTextBoxFlag xmlns:ma14="http://schemas.microsoft.com/office/mac/drawingml/2011/main" xmlns="" xmlns:lc="http://schemas.openxmlformats.org/drawingml/2006/lockedCanvas" val="1"/>
+              <ma14:wrappingTextBoxFlag xmlns:lc="http://schemas.openxmlformats.org/drawingml/2006/lockedCanvas" xmlns="" xmlns:ma14="http://schemas.microsoft.com/office/mac/drawingml/2011/main" val="1"/>
             </a:ext>
           </a:extLst>
         </p:spPr>
@@ -15158,7 +14853,7 @@
           </a:ln>
           <a:extLst>
             <a:ext uri="{C572A759-6A51-4108-AA02-DFA0A04FC94B}">
-              <ma14:wrappingTextBoxFlag xmlns:ma14="http://schemas.microsoft.com/office/mac/drawingml/2011/main" xmlns="" xmlns:lc="http://schemas.openxmlformats.org/drawingml/2006/lockedCanvas" val="1"/>
+              <ma14:wrappingTextBoxFlag xmlns:lc="http://schemas.openxmlformats.org/drawingml/2006/lockedCanvas" xmlns="" xmlns:ma14="http://schemas.microsoft.com/office/mac/drawingml/2011/main" val="1"/>
             </a:ext>
           </a:extLst>
         </p:spPr>
@@ -15724,7 +15419,7 @@
           </a:ln>
           <a:extLst>
             <a:ext uri="{C572A759-6A51-4108-AA02-DFA0A04FC94B}">
-              <ma14:wrappingTextBoxFlag xmlns:lc="http://schemas.openxmlformats.org/drawingml/2006/lockedCanvas" xmlns="" xmlns:ma14="http://schemas.microsoft.com/office/mac/drawingml/2011/main" val="1"/>
+              <ma14:wrappingTextBoxFlag xmlns:ma14="http://schemas.microsoft.com/office/mac/drawingml/2011/main" xmlns="" xmlns:lc="http://schemas.openxmlformats.org/drawingml/2006/lockedCanvas" val="1"/>
             </a:ext>
           </a:extLst>
         </p:spPr>

</xml_diff>